<commit_message>
Updates for pilot class
</commit_message>
<xml_diff>
--- a/labmanual/Drawings/classic.pptx
+++ b/labmanual/Drawings/classic.pptx
@@ -202,7 +202,7 @@
           <a:p>
             <a:fld id="{5C78E9C7-9CA3-A64A-B46C-6E620848F682}" type="datetimeFigureOut">
               <a:rPr lang="en-US" smtClean="0"/>
-              <a:t>6/8/18</a:t>
+              <a:t>6/11/2018</a:t>
             </a:fld>
             <a:endParaRPr lang="en-US"/>
           </a:p>
@@ -600,7 +600,7 @@
           <a:p>
             <a:fld id="{FB5F2AB9-D88E-BD44-B295-056A7213B648}" type="datetimeFigureOut">
               <a:rPr lang="en-US" smtClean="0"/>
-              <a:t>6/8/18</a:t>
+              <a:t>6/11/2018</a:t>
             </a:fld>
             <a:endParaRPr lang="en-US"/>
           </a:p>
@@ -765,7 +765,7 @@
           <a:p>
             <a:fld id="{FB5F2AB9-D88E-BD44-B295-056A7213B648}" type="datetimeFigureOut">
               <a:rPr lang="en-US" smtClean="0"/>
-              <a:t>6/8/18</a:t>
+              <a:t>6/11/2018</a:t>
             </a:fld>
             <a:endParaRPr lang="en-US"/>
           </a:p>
@@ -940,7 +940,7 @@
           <a:p>
             <a:fld id="{FB5F2AB9-D88E-BD44-B295-056A7213B648}" type="datetimeFigureOut">
               <a:rPr lang="en-US" smtClean="0"/>
-              <a:t>6/8/18</a:t>
+              <a:t>6/11/2018</a:t>
             </a:fld>
             <a:endParaRPr lang="en-US"/>
           </a:p>
@@ -1134,7 +1134,7 @@
                 </a:solidFill>
               </a:rPr>
               <a:pPr/>
-              <a:t>6/9/18</a:t>
+              <a:t>6/11/2018</a:t>
             </a:fld>
             <a:endParaRPr lang="en-US">
               <a:solidFill>
@@ -1332,7 +1332,7 @@
                 </a:solidFill>
               </a:rPr>
               <a:pPr/>
-              <a:t>6/9/18</a:t>
+              <a:t>6/11/2018</a:t>
             </a:fld>
             <a:endParaRPr lang="en-US">
               <a:solidFill>
@@ -1604,7 +1604,7 @@
                 </a:solidFill>
               </a:rPr>
               <a:pPr/>
-              <a:t>6/9/18</a:t>
+              <a:t>6/11/2018</a:t>
             </a:fld>
             <a:endParaRPr lang="en-US">
               <a:solidFill>
@@ -1864,7 +1864,7 @@
                 </a:solidFill>
               </a:rPr>
               <a:pPr/>
-              <a:t>6/9/18</a:t>
+              <a:t>6/11/2018</a:t>
             </a:fld>
             <a:endParaRPr lang="en-US">
               <a:solidFill>
@@ -2259,7 +2259,7 @@
                 </a:solidFill>
               </a:rPr>
               <a:pPr/>
-              <a:t>6/9/18</a:t>
+              <a:t>6/11/2018</a:t>
             </a:fld>
             <a:endParaRPr lang="en-US">
               <a:solidFill>
@@ -2405,7 +2405,7 @@
                 </a:solidFill>
               </a:rPr>
               <a:pPr/>
-              <a:t>6/9/18</a:t>
+              <a:t>6/11/2018</a:t>
             </a:fld>
             <a:endParaRPr lang="en-US">
               <a:solidFill>
@@ -2528,7 +2528,7 @@
                 </a:solidFill>
               </a:rPr>
               <a:pPr/>
-              <a:t>6/9/18</a:t>
+              <a:t>6/11/2018</a:t>
             </a:fld>
             <a:endParaRPr lang="en-US">
               <a:solidFill>
@@ -2833,7 +2833,7 @@
                 </a:solidFill>
               </a:rPr>
               <a:pPr/>
-              <a:t>6/9/18</a:t>
+              <a:t>6/11/2018</a:t>
             </a:fld>
             <a:endParaRPr lang="en-US">
               <a:solidFill>
@@ -3024,7 +3024,7 @@
           <a:p>
             <a:fld id="{FB5F2AB9-D88E-BD44-B295-056A7213B648}" type="datetimeFigureOut">
               <a:rPr lang="en-US" smtClean="0"/>
-              <a:t>6/8/18</a:t>
+              <a:t>6/11/2018</a:t>
             </a:fld>
             <a:endParaRPr lang="en-US"/>
           </a:p>
@@ -3283,7 +3283,7 @@
                 </a:solidFill>
               </a:rPr>
               <a:pPr/>
-              <a:t>6/9/18</a:t>
+              <a:t>6/11/2018</a:t>
             </a:fld>
             <a:endParaRPr lang="en-US">
               <a:solidFill>
@@ -3481,7 +3481,7 @@
                 </a:solidFill>
               </a:rPr>
               <a:pPr/>
-              <a:t>6/9/18</a:t>
+              <a:t>6/11/2018</a:t>
             </a:fld>
             <a:endParaRPr lang="en-US">
               <a:solidFill>
@@ -3689,7 +3689,7 @@
                 </a:solidFill>
               </a:rPr>
               <a:pPr/>
-              <a:t>6/9/18</a:t>
+              <a:t>6/11/2018</a:t>
             </a:fld>
             <a:endParaRPr lang="en-US">
               <a:solidFill>
@@ -3909,7 +3909,7 @@
                 </a:solidFill>
               </a:rPr>
               <a:pPr/>
-              <a:t>6/9/18</a:t>
+              <a:t>6/11/2018</a:t>
             </a:fld>
             <a:endParaRPr lang="en-US">
               <a:solidFill>
@@ -4107,7 +4107,7 @@
                 </a:solidFill>
               </a:rPr>
               <a:pPr/>
-              <a:t>6/9/18</a:t>
+              <a:t>6/11/2018</a:t>
             </a:fld>
             <a:endParaRPr lang="en-US">
               <a:solidFill>
@@ -4379,7 +4379,7 @@
                 </a:solidFill>
               </a:rPr>
               <a:pPr/>
-              <a:t>6/9/18</a:t>
+              <a:t>6/11/2018</a:t>
             </a:fld>
             <a:endParaRPr lang="en-US">
               <a:solidFill>
@@ -4639,7 +4639,7 @@
                 </a:solidFill>
               </a:rPr>
               <a:pPr/>
-              <a:t>6/9/18</a:t>
+              <a:t>6/11/2018</a:t>
             </a:fld>
             <a:endParaRPr lang="en-US">
               <a:solidFill>
@@ -5034,7 +5034,7 @@
                 </a:solidFill>
               </a:rPr>
               <a:pPr/>
-              <a:t>6/9/18</a:t>
+              <a:t>6/11/2018</a:t>
             </a:fld>
             <a:endParaRPr lang="en-US">
               <a:solidFill>
@@ -5180,7 +5180,7 @@
                 </a:solidFill>
               </a:rPr>
               <a:pPr/>
-              <a:t>6/9/18</a:t>
+              <a:t>6/11/2018</a:t>
             </a:fld>
             <a:endParaRPr lang="en-US">
               <a:solidFill>
@@ -5303,7 +5303,7 @@
                 </a:solidFill>
               </a:rPr>
               <a:pPr/>
-              <a:t>6/9/18</a:t>
+              <a:t>6/11/2018</a:t>
             </a:fld>
             <a:endParaRPr lang="en-US">
               <a:solidFill>
@@ -5568,7 +5568,7 @@
           <a:p>
             <a:fld id="{FB5F2AB9-D88E-BD44-B295-056A7213B648}" type="datetimeFigureOut">
               <a:rPr lang="en-US" smtClean="0"/>
-              <a:t>6/8/18</a:t>
+              <a:t>6/11/2018</a:t>
             </a:fld>
             <a:endParaRPr lang="en-US"/>
           </a:p>
@@ -5847,7 +5847,7 @@
                 </a:solidFill>
               </a:rPr>
               <a:pPr/>
-              <a:t>6/9/18</a:t>
+              <a:t>6/11/2018</a:t>
             </a:fld>
             <a:endParaRPr lang="en-US">
               <a:solidFill>
@@ -6132,7 +6132,7 @@
                 </a:solidFill>
               </a:rPr>
               <a:pPr/>
-              <a:t>6/9/18</a:t>
+              <a:t>6/11/2018</a:t>
             </a:fld>
             <a:endParaRPr lang="en-US">
               <a:solidFill>
@@ -6330,7 +6330,7 @@
                 </a:solidFill>
               </a:rPr>
               <a:pPr/>
-              <a:t>6/9/18</a:t>
+              <a:t>6/11/2018</a:t>
             </a:fld>
             <a:endParaRPr lang="en-US">
               <a:solidFill>
@@ -6538,7 +6538,7 @@
                 </a:solidFill>
               </a:rPr>
               <a:pPr/>
-              <a:t>6/9/18</a:t>
+              <a:t>6/11/2018</a:t>
             </a:fld>
             <a:endParaRPr lang="en-US">
               <a:solidFill>
@@ -6791,7 +6791,7 @@
           <a:p>
             <a:fld id="{FB5F2AB9-D88E-BD44-B295-056A7213B648}" type="datetimeFigureOut">
               <a:rPr lang="en-US" smtClean="0"/>
-              <a:t>6/8/18</a:t>
+              <a:t>6/11/2018</a:t>
             </a:fld>
             <a:endParaRPr lang="en-US"/>
           </a:p>
@@ -7153,7 +7153,7 @@
           <a:p>
             <a:fld id="{FB5F2AB9-D88E-BD44-B295-056A7213B648}" type="datetimeFigureOut">
               <a:rPr lang="en-US" smtClean="0"/>
-              <a:t>6/8/18</a:t>
+              <a:t>6/11/2018</a:t>
             </a:fld>
             <a:endParaRPr lang="en-US"/>
           </a:p>
@@ -7266,7 +7266,7 @@
           <a:p>
             <a:fld id="{FB5F2AB9-D88E-BD44-B295-056A7213B648}" type="datetimeFigureOut">
               <a:rPr lang="en-US" smtClean="0"/>
-              <a:t>6/8/18</a:t>
+              <a:t>6/11/2018</a:t>
             </a:fld>
             <a:endParaRPr lang="en-US"/>
           </a:p>
@@ -7356,7 +7356,7 @@
           <a:p>
             <a:fld id="{FB5F2AB9-D88E-BD44-B295-056A7213B648}" type="datetimeFigureOut">
               <a:rPr lang="en-US" smtClean="0"/>
-              <a:t>6/8/18</a:t>
+              <a:t>6/11/2018</a:t>
             </a:fld>
             <a:endParaRPr lang="en-US"/>
           </a:p>
@@ -7628,7 +7628,7 @@
           <a:p>
             <a:fld id="{FB5F2AB9-D88E-BD44-B295-056A7213B648}" type="datetimeFigureOut">
               <a:rPr lang="en-US" smtClean="0"/>
-              <a:t>6/8/18</a:t>
+              <a:t>6/11/2018</a:t>
             </a:fld>
             <a:endParaRPr lang="en-US"/>
           </a:p>
@@ -7880,7 +7880,7 @@
           <a:p>
             <a:fld id="{FB5F2AB9-D88E-BD44-B295-056A7213B648}" type="datetimeFigureOut">
               <a:rPr lang="en-US" smtClean="0"/>
-              <a:t>6/8/18</a:t>
+              <a:t>6/11/2018</a:t>
             </a:fld>
             <a:endParaRPr lang="en-US"/>
           </a:p>
@@ -8088,7 +8088,7 @@
           <a:p>
             <a:fld id="{FB5F2AB9-D88E-BD44-B295-056A7213B648}" type="datetimeFigureOut">
               <a:rPr lang="en-US" smtClean="0"/>
-              <a:t>6/8/18</a:t>
+              <a:t>6/11/2018</a:t>
             </a:fld>
             <a:endParaRPr lang="en-US"/>
           </a:p>
@@ -8636,7 +8636,7 @@
                 </a:solidFill>
               </a:rPr>
               <a:pPr defTabSz="311719"/>
-              <a:t>6/9/18</a:t>
+              <a:t>6/11/2018</a:t>
             </a:fld>
             <a:endParaRPr lang="en-US">
               <a:solidFill>
@@ -9211,7 +9211,7 @@
                 </a:solidFill>
               </a:rPr>
               <a:pPr defTabSz="311719"/>
-              <a:t>6/9/18</a:t>
+              <a:t>6/11/2018</a:t>
             </a:fld>
             <a:endParaRPr lang="en-US">
               <a:solidFill>
@@ -14950,7 +14950,7 @@
           <p:cNvPr id="3" name="Arrow: Left-Right 2">
             <a:extLst>
               <a:ext uri="{FF2B5EF4-FFF2-40B4-BE49-F238E27FC236}">
-                <a16:creationId xmlns:a16="http://schemas.microsoft.com/office/drawing/2014/main" xmlns="" id="{009ED4C6-1977-48D3-AD93-9DE4D0021D63}"/>
+                <a16:creationId xmlns:a16="http://schemas.microsoft.com/office/drawing/2014/main" id="{009ED4C6-1977-48D3-AD93-9DE4D0021D63}"/>
               </a:ext>
             </a:extLst>
           </p:cNvPr>
@@ -15001,13 +15001,6 @@
   <p:clrMapOvr>
     <a:masterClrMapping/>
   </p:clrMapOvr>
-  <p:timing>
-    <p:tnLst>
-      <p:par>
-        <p:cTn id="1" dur="indefinite" restart="never" nodeType="tmRoot"/>
-      </p:par>
-    </p:tnLst>
-  </p:timing>
 </p:sld>
 </file>
 
@@ -15066,17 +15059,16 @@
             <a:p>
               <a:pPr algn="ctr"/>
               <a:r>
-                <a:rPr lang="en-US" dirty="0" smtClean="0"/>
+                <a:rPr lang="en-US" dirty="0"/>
                 <a:t>Connected</a:t>
               </a:r>
             </a:p>
             <a:p>
               <a:pPr algn="ctr"/>
               <a:r>
-                <a:rPr lang="en-US" dirty="0" smtClean="0"/>
+                <a:rPr lang="en-US" dirty="0"/>
                 <a:t>Active</a:t>
               </a:r>
-              <a:endParaRPr lang="en-US" dirty="0"/>
             </a:p>
           </p:txBody>
         </p:sp>
@@ -15118,10 +15110,9 @@
               <a:p>
                 <a:pPr algn="ctr"/>
                 <a:r>
-                  <a:rPr lang="en-US" dirty="0" smtClean="0"/>
+                  <a:rPr lang="en-US" dirty="0"/>
                   <a:t>Standby</a:t>
                 </a:r>
-                <a:endParaRPr lang="en-US" dirty="0"/>
               </a:p>
             </p:txBody>
           </p:sp>
@@ -15149,10 +15140,9 @@
               <a:p>
                 <a:pPr algn="ctr"/>
                 <a:r>
-                  <a:rPr lang="en-US" dirty="0" smtClean="0"/>
+                  <a:rPr lang="en-US" dirty="0"/>
                   <a:t>Standby</a:t>
                 </a:r>
-                <a:endParaRPr lang="en-US" dirty="0"/>
               </a:p>
             </p:txBody>
           </p:sp>
@@ -15181,17 +15171,16 @@
             <a:p>
               <a:pPr algn="ctr"/>
               <a:r>
-                <a:rPr lang="en-US" dirty="0" smtClean="0"/>
+                <a:rPr lang="en-US" dirty="0"/>
                 <a:t>Connected</a:t>
               </a:r>
             </a:p>
             <a:p>
               <a:pPr algn="ctr"/>
               <a:r>
-                <a:rPr lang="en-US" dirty="0" smtClean="0"/>
+                <a:rPr lang="en-US" dirty="0"/>
                 <a:t>Active</a:t>
               </a:r>
-              <a:endParaRPr lang="en-US" dirty="0"/>
             </a:p>
           </p:txBody>
         </p:sp>
@@ -15219,17 +15208,16 @@
             <a:p>
               <a:pPr algn="ctr"/>
               <a:r>
-                <a:rPr lang="en-US" u="sng" dirty="0" smtClean="0"/>
+                <a:rPr lang="en-US" u="sng" dirty="0"/>
                 <a:t>WICED Slave</a:t>
               </a:r>
             </a:p>
             <a:p>
               <a:pPr algn="ctr"/>
               <a:r>
-                <a:rPr lang="en-US" u="sng" dirty="0" smtClean="0"/>
+                <a:rPr lang="en-US" u="sng" dirty="0"/>
                 <a:t>State</a:t>
               </a:r>
-              <a:endParaRPr lang="en-US" u="sng" dirty="0"/>
             </a:p>
           </p:txBody>
         </p:sp>
@@ -15257,17 +15245,16 @@
             <a:p>
               <a:pPr algn="ctr"/>
               <a:r>
-                <a:rPr lang="en-US" u="sng" dirty="0" smtClean="0"/>
+                <a:rPr lang="en-US" u="sng" dirty="0"/>
                 <a:t>Master</a:t>
               </a:r>
             </a:p>
             <a:p>
               <a:pPr algn="ctr"/>
               <a:r>
-                <a:rPr lang="en-US" u="sng" dirty="0" smtClean="0"/>
+                <a:rPr lang="en-US" u="sng" dirty="0"/>
                 <a:t>State</a:t>
               </a:r>
-              <a:endParaRPr lang="en-US" u="sng" dirty="0"/>
             </a:p>
           </p:txBody>
         </p:sp>
@@ -15309,10 +15296,9 @@
               <a:p>
                 <a:pPr algn="ctr"/>
                 <a:r>
-                  <a:rPr lang="en-US" dirty="0" smtClean="0"/>
+                  <a:rPr lang="en-US" dirty="0"/>
                   <a:t>Bonding</a:t>
                 </a:r>
-                <a:endParaRPr lang="en-US" dirty="0"/>
               </a:p>
             </p:txBody>
           </p:sp>
@@ -15340,18 +15326,17 @@
               <a:p>
                 <a:pPr algn="ctr"/>
                 <a:r>
-                  <a:rPr lang="en-US" sz="800" dirty="0" smtClean="0"/>
+                  <a:rPr lang="en-US" sz="800" dirty="0"/>
                   <a:t>Both side save Link Key, BD </a:t>
                 </a:r>
                 <a:r>
-                  <a:rPr lang="en-US" sz="800" dirty="0" err="1" smtClean="0"/>
+                  <a:rPr lang="en-US" sz="800" dirty="0" err="1"/>
                   <a:t>Addr</a:t>
                 </a:r>
                 <a:r>
-                  <a:rPr lang="en-US" sz="800" dirty="0" smtClean="0"/>
+                  <a:rPr lang="en-US" sz="800" dirty="0"/>
                   <a:t> Tuple to Non Volatile Storage (no data exchange)</a:t>
                 </a:r>
-                <a:endParaRPr lang="en-US" sz="800" dirty="0"/>
               </a:p>
             </p:txBody>
           </p:sp>
@@ -15624,10 +15609,9 @@
                 <a:p>
                   <a:pPr algn="ctr"/>
                   <a:r>
-                    <a:rPr lang="en-US" dirty="0" smtClean="0"/>
+                    <a:rPr lang="en-US" dirty="0"/>
                     <a:t>Inquiry Scan</a:t>
                   </a:r>
-                  <a:endParaRPr lang="en-US" dirty="0"/>
                 </a:p>
               </p:txBody>
             </p:sp>
@@ -15655,10 +15639,9 @@
                 <a:p>
                   <a:pPr algn="ctr"/>
                   <a:r>
-                    <a:rPr lang="en-US" dirty="0" smtClean="0"/>
+                    <a:rPr lang="en-US" dirty="0"/>
                     <a:t>Inquiry</a:t>
                   </a:r>
-                  <a:endParaRPr lang="en-US" dirty="0"/>
                 </a:p>
               </p:txBody>
             </p:sp>
@@ -15747,18 +15730,17 @@
                     <a:p>
                       <a:pPr algn="ctr"/>
                       <a:r>
-                        <a:rPr lang="en-US" sz="800" dirty="0" smtClean="0"/>
+                        <a:rPr lang="en-US" sz="800" dirty="0"/>
                         <a:t>Extended Inquiry Response Packet </a:t>
                       </a:r>
                       <a:r>
-                        <a:rPr lang="mr-IN" sz="800" dirty="0" smtClean="0"/>
+                        <a:rPr lang="mr-IN" sz="800" dirty="0"/>
                         <a:t>–</a:t>
                       </a:r>
                       <a:r>
-                        <a:rPr lang="en-US" sz="800" dirty="0" smtClean="0"/>
+                        <a:rPr lang="en-US" sz="800" dirty="0"/>
                         <a:t> BD ADDR, Name, Services</a:t>
                       </a:r>
-                      <a:endParaRPr lang="en-US" sz="800" dirty="0"/>
                     </a:p>
                   </p:txBody>
                 </p:sp>
@@ -15835,7 +15817,7 @@
                     <a:p>
                       <a:pPr algn="ctr"/>
                       <a:r>
-                        <a:rPr lang="en-US" sz="800" smtClean="0"/>
+                        <a:rPr lang="en-US" sz="800"/>
                         <a:t>Broadcast Inquiry</a:t>
                       </a:r>
                       <a:endParaRPr lang="en-US" sz="800" dirty="0"/>
@@ -15869,10 +15851,9 @@
               <a:p>
                 <a:pPr algn="ctr"/>
                 <a:r>
-                  <a:rPr lang="en-US" dirty="0" smtClean="0"/>
+                  <a:rPr lang="en-US" dirty="0"/>
                   <a:t>Inquire</a:t>
                 </a:r>
-                <a:endParaRPr lang="en-US" dirty="0"/>
               </a:p>
             </p:txBody>
           </p:sp>
@@ -15915,10 +15896,9 @@
               <a:p>
                 <a:pPr algn="ctr"/>
                 <a:r>
-                  <a:rPr lang="en-US" dirty="0" smtClean="0"/>
+                  <a:rPr lang="en-US" dirty="0"/>
                   <a:t>Page Scan</a:t>
                 </a:r>
-                <a:endParaRPr lang="en-US" dirty="0"/>
               </a:p>
             </p:txBody>
           </p:sp>
@@ -15946,10 +15926,9 @@
               <a:p>
                 <a:pPr algn="ctr"/>
                 <a:r>
-                  <a:rPr lang="en-US" dirty="0" smtClean="0"/>
+                  <a:rPr lang="en-US" dirty="0"/>
                   <a:t>Page Scan</a:t>
                 </a:r>
-                <a:endParaRPr lang="en-US" dirty="0"/>
               </a:p>
             </p:txBody>
           </p:sp>
@@ -16053,10 +16032,9 @@
                     <a:p>
                       <a:pPr algn="ctr"/>
                       <a:r>
-                        <a:rPr lang="en-US" sz="800" dirty="0" smtClean="0"/>
+                        <a:rPr lang="en-US" sz="800" dirty="0"/>
                         <a:t>Link Manager Connection Accept</a:t>
                       </a:r>
-                      <a:endParaRPr lang="en-US" sz="800" dirty="0"/>
                     </a:p>
                   </p:txBody>
                 </p:sp>
@@ -16133,10 +16111,9 @@
                     <a:p>
                       <a:pPr algn="ctr"/>
                       <a:r>
-                        <a:rPr lang="en-US" sz="800" dirty="0" smtClean="0"/>
+                        <a:rPr lang="en-US" sz="800" dirty="0"/>
                         <a:t>Link Manager Connection Request</a:t>
                       </a:r>
-                      <a:endParaRPr lang="en-US" sz="800" dirty="0"/>
                     </a:p>
                   </p:txBody>
                 </p:sp>
@@ -16166,10 +16143,9 @@
                 <a:p>
                   <a:pPr algn="ctr"/>
                   <a:r>
-                    <a:rPr lang="en-US" dirty="0" smtClean="0"/>
+                    <a:rPr lang="en-US" dirty="0"/>
                     <a:t>Paging</a:t>
                   </a:r>
-                  <a:endParaRPr lang="en-US" dirty="0"/>
                 </a:p>
               </p:txBody>
             </p:sp>
@@ -16213,10 +16189,9 @@
               <a:p>
                 <a:pPr algn="ctr"/>
                 <a:r>
-                  <a:rPr lang="en-US" dirty="0" smtClean="0"/>
+                  <a:rPr lang="en-US" dirty="0"/>
                   <a:t>Encrypt Link</a:t>
                 </a:r>
-                <a:endParaRPr lang="en-US" dirty="0"/>
               </a:p>
             </p:txBody>
           </p:sp>
@@ -16292,10 +16267,9 @@
                 <a:p>
                   <a:pPr algn="ctr"/>
                   <a:r>
-                    <a:rPr lang="en-US" sz="800" dirty="0" smtClean="0"/>
+                    <a:rPr lang="en-US" sz="800" dirty="0"/>
                     <a:t>Request &amp; Accept encrypted Link using Link Key</a:t>
                   </a:r>
-                  <a:endParaRPr lang="en-US" sz="800" dirty="0"/>
                 </a:p>
               </p:txBody>
             </p:sp>
@@ -16339,10 +16313,9 @@
               <a:p>
                 <a:pPr algn="ctr"/>
                 <a:r>
-                  <a:rPr lang="en-US" dirty="0" smtClean="0"/>
+                  <a:rPr lang="en-US" dirty="0"/>
                   <a:t>Service Discovery</a:t>
                 </a:r>
-                <a:endParaRPr lang="en-US" dirty="0"/>
               </a:p>
             </p:txBody>
           </p:sp>
@@ -16418,10 +16391,9 @@
                 <a:p>
                   <a:pPr algn="ctr"/>
                   <a:r>
-                    <a:rPr lang="en-US" sz="800" dirty="0" smtClean="0"/>
+                    <a:rPr lang="en-US" sz="800" dirty="0"/>
                     <a:t>Exchange SDP Database</a:t>
                   </a:r>
-                  <a:endParaRPr lang="en-US" sz="800" dirty="0"/>
                 </a:p>
               </p:txBody>
             </p:sp>
@@ -16465,10 +16437,9 @@
               <a:p>
                 <a:pPr algn="ctr"/>
                 <a:r>
-                  <a:rPr lang="en-US" dirty="0" smtClean="0"/>
+                  <a:rPr lang="en-US" dirty="0"/>
                   <a:t>Pairing</a:t>
                 </a:r>
-                <a:endParaRPr lang="en-US" dirty="0"/>
               </a:p>
             </p:txBody>
           </p:sp>
@@ -16561,10 +16532,9 @@
                   <a:p>
                     <a:pPr algn="ctr"/>
                     <a:r>
-                      <a:rPr lang="en-US" sz="800" dirty="0" smtClean="0"/>
+                      <a:rPr lang="en-US" sz="800" dirty="0"/>
                       <a:t>Exchange IO Capabilities with Pairing Request and Pairing Response</a:t>
                     </a:r>
-                    <a:endParaRPr lang="en-US" sz="800" dirty="0"/>
                   </a:p>
                 </p:txBody>
               </p:sp>
@@ -16644,26 +16614,9 @@
                   <a:p>
                     <a:pPr algn="ctr"/>
                     <a:r>
-                      <a:rPr lang="en-US" sz="800" dirty="0" smtClean="0"/>
-                      <a:t>Both sides create &amp; exchange </a:t>
+                      <a:rPr lang="en-US" sz="800" dirty="0"/>
+                      <a:t>Both sides create &amp; exchange random numbers encrypted with Pin + BDADDR+ </a:t>
                     </a:r>
-                    <a:r>
-                      <a:rPr lang="en-US" sz="800" dirty="0"/>
-                      <a:t>r</a:t>
-                    </a:r>
-                    <a:r>
-                      <a:rPr lang="en-US" sz="800" dirty="0" smtClean="0"/>
-                      <a:t>andom numbers </a:t>
-                    </a:r>
-                    <a:r>
-                      <a:rPr lang="en-US" sz="800" dirty="0"/>
-                      <a:t>e</a:t>
-                    </a:r>
-                    <a:r>
-                      <a:rPr lang="en-US" sz="800" dirty="0" smtClean="0"/>
-                      <a:t>ncrypted with Pin + BDADDR+ </a:t>
-                    </a:r>
-                    <a:endParaRPr lang="en-US" sz="800" dirty="0"/>
                   </a:p>
                 </p:txBody>
               </p:sp>
@@ -16693,10 +16646,9 @@
               <a:p>
                 <a:pPr algn="ctr"/>
                 <a:r>
-                  <a:rPr lang="en-US" sz="800" dirty="0" smtClean="0"/>
+                  <a:rPr lang="en-US" sz="800" dirty="0"/>
                   <a:t>Link Keys are created using exchanged data (no data exchange)</a:t>
                 </a:r>
-                <a:endParaRPr lang="en-US" sz="800" dirty="0"/>
               </a:p>
             </p:txBody>
           </p:sp>
@@ -16739,10 +16691,9 @@
               <a:p>
                 <a:pPr algn="ctr"/>
                 <a:r>
-                  <a:rPr lang="en-US" dirty="0" smtClean="0"/>
+                  <a:rPr lang="en-US" dirty="0"/>
                   <a:t>Exchange Data</a:t>
                 </a:r>
-                <a:endParaRPr lang="en-US" dirty="0"/>
               </a:p>
             </p:txBody>
           </p:sp>
@@ -16818,11 +16769,11 @@
                 <a:p>
                   <a:pPr algn="ctr"/>
                   <a:r>
-                    <a:rPr lang="en-US" sz="800" dirty="0" smtClean="0"/>
+                    <a:rPr lang="en-US" sz="800" dirty="0"/>
                     <a:t>SPP </a:t>
                   </a:r>
                   <a:r>
-                    <a:rPr lang="en-US" sz="800" dirty="0" smtClean="0">
+                    <a:rPr lang="en-US" sz="800" dirty="0">
                       <a:sym typeface="Wingdings"/>
                     </a:rPr>
                     <a:t>  RFCOMM</a:t>
@@ -16844,13 +16795,6 @@
   <p:clrMapOvr>
     <a:masterClrMapping/>
   </p:clrMapOvr>
-  <p:timing>
-    <p:tnLst>
-      <p:par>
-        <p:cTn id="1" dur="indefinite" restart="never" nodeType="tmRoot"/>
-      </p:par>
-    </p:tnLst>
-  </p:timing>
 </p:sld>
 </file>
 
@@ -16876,7 +16820,7 @@
           <p:cNvPr id="180" name="Group 179">
             <a:extLst>
               <a:ext uri="{FF2B5EF4-FFF2-40B4-BE49-F238E27FC236}">
-                <a16:creationId xmlns:a16="http://schemas.microsoft.com/office/drawing/2014/main" xmlns="" id="{444A11D9-8973-4B16-AE45-6B045753A046}"/>
+                <a16:creationId xmlns:a16="http://schemas.microsoft.com/office/drawing/2014/main" id="{444A11D9-8973-4B16-AE45-6B045753A046}"/>
               </a:ext>
             </a:extLst>
           </p:cNvPr>
@@ -16896,7 +16840,7 @@
             <p:cNvPr id="176" name="Straight Connector 175">
               <a:extLst>
                 <a:ext uri="{FF2B5EF4-FFF2-40B4-BE49-F238E27FC236}">
-                  <a16:creationId xmlns:a16="http://schemas.microsoft.com/office/drawing/2014/main" xmlns="" id="{4B3A4A52-1251-489D-AB11-4C7FA504B88C}"/>
+                  <a16:creationId xmlns:a16="http://schemas.microsoft.com/office/drawing/2014/main" id="{4B3A4A52-1251-489D-AB11-4C7FA504B88C}"/>
                 </a:ext>
               </a:extLst>
             </p:cNvPr>
@@ -16946,7 +16890,7 @@
             <p:cNvPr id="174" name="Straight Connector 173">
               <a:extLst>
                 <a:ext uri="{FF2B5EF4-FFF2-40B4-BE49-F238E27FC236}">
-                  <a16:creationId xmlns:a16="http://schemas.microsoft.com/office/drawing/2014/main" xmlns="" id="{1C81992F-B3D8-4FDF-A450-7CD05CBE294C}"/>
+                  <a16:creationId xmlns:a16="http://schemas.microsoft.com/office/drawing/2014/main" id="{1C81992F-B3D8-4FDF-A450-7CD05CBE294C}"/>
                 </a:ext>
               </a:extLst>
             </p:cNvPr>
@@ -16996,7 +16940,7 @@
             <p:cNvPr id="169" name="Straight Connector 168">
               <a:extLst>
                 <a:ext uri="{FF2B5EF4-FFF2-40B4-BE49-F238E27FC236}">
-                  <a16:creationId xmlns:a16="http://schemas.microsoft.com/office/drawing/2014/main" xmlns="" id="{9F186C85-DA78-463B-8C69-8E15829D0E97}"/>
+                  <a16:creationId xmlns:a16="http://schemas.microsoft.com/office/drawing/2014/main" id="{9F186C85-DA78-463B-8C69-8E15829D0E97}"/>
                 </a:ext>
               </a:extLst>
             </p:cNvPr>
@@ -17046,7 +16990,7 @@
             <p:cNvPr id="167" name="Straight Connector 166">
               <a:extLst>
                 <a:ext uri="{FF2B5EF4-FFF2-40B4-BE49-F238E27FC236}">
-                  <a16:creationId xmlns:a16="http://schemas.microsoft.com/office/drawing/2014/main" xmlns="" id="{AADC7CEF-3F64-40CE-826A-ADF54345AD4B}"/>
+                  <a16:creationId xmlns:a16="http://schemas.microsoft.com/office/drawing/2014/main" id="{AADC7CEF-3F64-40CE-826A-ADF54345AD4B}"/>
                 </a:ext>
               </a:extLst>
             </p:cNvPr>
@@ -17096,7 +17040,7 @@
             <p:cNvPr id="160" name="Straight Connector 159">
               <a:extLst>
                 <a:ext uri="{FF2B5EF4-FFF2-40B4-BE49-F238E27FC236}">
-                  <a16:creationId xmlns:a16="http://schemas.microsoft.com/office/drawing/2014/main" xmlns="" id="{3EE70462-2985-40A1-8D6E-B81E2EDA33CC}"/>
+                  <a16:creationId xmlns:a16="http://schemas.microsoft.com/office/drawing/2014/main" id="{3EE70462-2985-40A1-8D6E-B81E2EDA33CC}"/>
                 </a:ext>
               </a:extLst>
             </p:cNvPr>
@@ -17146,7 +17090,7 @@
             <p:cNvPr id="162" name="Straight Connector 161">
               <a:extLst>
                 <a:ext uri="{FF2B5EF4-FFF2-40B4-BE49-F238E27FC236}">
-                  <a16:creationId xmlns:a16="http://schemas.microsoft.com/office/drawing/2014/main" xmlns="" id="{49834E44-CDA2-4053-A5A9-56437BA2AC99}"/>
+                  <a16:creationId xmlns:a16="http://schemas.microsoft.com/office/drawing/2014/main" id="{49834E44-CDA2-4053-A5A9-56437BA2AC99}"/>
                 </a:ext>
               </a:extLst>
             </p:cNvPr>
@@ -17196,7 +17140,7 @@
             <p:cNvPr id="149" name="Straight Connector 148">
               <a:extLst>
                 <a:ext uri="{FF2B5EF4-FFF2-40B4-BE49-F238E27FC236}">
-                  <a16:creationId xmlns:a16="http://schemas.microsoft.com/office/drawing/2014/main" xmlns="" id="{53EEDD3B-73D6-4968-80BC-03B0E38AA5EA}"/>
+                  <a16:creationId xmlns:a16="http://schemas.microsoft.com/office/drawing/2014/main" id="{53EEDD3B-73D6-4968-80BC-03B0E38AA5EA}"/>
                 </a:ext>
               </a:extLst>
             </p:cNvPr>
@@ -17246,7 +17190,7 @@
             <p:cNvPr id="146" name="Straight Connector 145">
               <a:extLst>
                 <a:ext uri="{FF2B5EF4-FFF2-40B4-BE49-F238E27FC236}">
-                  <a16:creationId xmlns:a16="http://schemas.microsoft.com/office/drawing/2014/main" xmlns="" id="{E3936F8F-E678-4308-84B9-2A316B1E579A}"/>
+                  <a16:creationId xmlns:a16="http://schemas.microsoft.com/office/drawing/2014/main" id="{E3936F8F-E678-4308-84B9-2A316B1E579A}"/>
                 </a:ext>
               </a:extLst>
             </p:cNvPr>
@@ -17296,7 +17240,7 @@
             <p:cNvPr id="126" name="Straight Connector 125">
               <a:extLst>
                 <a:ext uri="{FF2B5EF4-FFF2-40B4-BE49-F238E27FC236}">
-                  <a16:creationId xmlns:a16="http://schemas.microsoft.com/office/drawing/2014/main" xmlns="" id="{89CC8196-A03E-4C41-BB0A-1315B3FFD3A8}"/>
+                  <a16:creationId xmlns:a16="http://schemas.microsoft.com/office/drawing/2014/main" id="{89CC8196-A03E-4C41-BB0A-1315B3FFD3A8}"/>
                 </a:ext>
               </a:extLst>
             </p:cNvPr>
@@ -17346,7 +17290,7 @@
             <p:cNvPr id="21" name="Straight Connector 20">
               <a:extLst>
                 <a:ext uri="{FF2B5EF4-FFF2-40B4-BE49-F238E27FC236}">
-                  <a16:creationId xmlns:a16="http://schemas.microsoft.com/office/drawing/2014/main" xmlns="" id="{80332405-90BF-4520-A306-2C9B012FD45F}"/>
+                  <a16:creationId xmlns:a16="http://schemas.microsoft.com/office/drawing/2014/main" id="{80332405-90BF-4520-A306-2C9B012FD45F}"/>
                 </a:ext>
               </a:extLst>
             </p:cNvPr>
@@ -17396,7 +17340,7 @@
             <p:cNvPr id="108" name="Straight Connector 107">
               <a:extLst>
                 <a:ext uri="{FF2B5EF4-FFF2-40B4-BE49-F238E27FC236}">
-                  <a16:creationId xmlns:a16="http://schemas.microsoft.com/office/drawing/2014/main" xmlns="" id="{E9148A74-33CF-42D8-9545-D1752EA08EE1}"/>
+                  <a16:creationId xmlns:a16="http://schemas.microsoft.com/office/drawing/2014/main" id="{E9148A74-33CF-42D8-9545-D1752EA08EE1}"/>
                 </a:ext>
               </a:extLst>
             </p:cNvPr>
@@ -17446,7 +17390,7 @@
             <p:cNvPr id="112" name="Straight Connector 111">
               <a:extLst>
                 <a:ext uri="{FF2B5EF4-FFF2-40B4-BE49-F238E27FC236}">
-                  <a16:creationId xmlns:a16="http://schemas.microsoft.com/office/drawing/2014/main" xmlns="" id="{6051BCEC-ED3D-4C30-ACE7-21B5CF08F2AF}"/>
+                  <a16:creationId xmlns:a16="http://schemas.microsoft.com/office/drawing/2014/main" id="{6051BCEC-ED3D-4C30-ACE7-21B5CF08F2AF}"/>
                 </a:ext>
               </a:extLst>
             </p:cNvPr>
@@ -17496,7 +17440,7 @@
             <p:cNvPr id="117" name="Straight Connector 116">
               <a:extLst>
                 <a:ext uri="{FF2B5EF4-FFF2-40B4-BE49-F238E27FC236}">
-                  <a16:creationId xmlns:a16="http://schemas.microsoft.com/office/drawing/2014/main" xmlns="" id="{383F769E-9A39-4D2B-A140-50F597143301}"/>
+                  <a16:creationId xmlns:a16="http://schemas.microsoft.com/office/drawing/2014/main" id="{383F769E-9A39-4D2B-A140-50F597143301}"/>
                 </a:ext>
               </a:extLst>
             </p:cNvPr>
@@ -17546,7 +17490,7 @@
             <p:cNvPr id="115" name="Straight Connector 114">
               <a:extLst>
                 <a:ext uri="{FF2B5EF4-FFF2-40B4-BE49-F238E27FC236}">
-                  <a16:creationId xmlns:a16="http://schemas.microsoft.com/office/drawing/2014/main" xmlns="" id="{73023383-1407-4344-A5C8-06FE8CA41955}"/>
+                  <a16:creationId xmlns:a16="http://schemas.microsoft.com/office/drawing/2014/main" id="{73023383-1407-4344-A5C8-06FE8CA41955}"/>
                 </a:ext>
               </a:extLst>
             </p:cNvPr>
@@ -17596,7 +17540,7 @@
             <p:cNvPr id="118" name="Straight Connector 117">
               <a:extLst>
                 <a:ext uri="{FF2B5EF4-FFF2-40B4-BE49-F238E27FC236}">
-                  <a16:creationId xmlns:a16="http://schemas.microsoft.com/office/drawing/2014/main" xmlns="" id="{CFF61708-597C-43A1-B3E1-E6673A3BAEF1}"/>
+                  <a16:creationId xmlns:a16="http://schemas.microsoft.com/office/drawing/2014/main" id="{CFF61708-597C-43A1-B3E1-E6673A3BAEF1}"/>
                 </a:ext>
               </a:extLst>
             </p:cNvPr>
@@ -17646,7 +17590,7 @@
             <p:cNvPr id="119" name="Straight Connector 118">
               <a:extLst>
                 <a:ext uri="{FF2B5EF4-FFF2-40B4-BE49-F238E27FC236}">
-                  <a16:creationId xmlns:a16="http://schemas.microsoft.com/office/drawing/2014/main" xmlns="" id="{BB36824D-3C80-4610-B77E-532DE47D8586}"/>
+                  <a16:creationId xmlns:a16="http://schemas.microsoft.com/office/drawing/2014/main" id="{BB36824D-3C80-4610-B77E-532DE47D8586}"/>
                 </a:ext>
               </a:extLst>
             </p:cNvPr>
@@ -17696,7 +17640,7 @@
             <p:cNvPr id="15" name="Freeform: Shape 14">
               <a:extLst>
                 <a:ext uri="{FF2B5EF4-FFF2-40B4-BE49-F238E27FC236}">
-                  <a16:creationId xmlns:a16="http://schemas.microsoft.com/office/drawing/2014/main" xmlns="" id="{38E9D512-FA57-4DF2-B003-B522999586B5}"/>
+                  <a16:creationId xmlns:a16="http://schemas.microsoft.com/office/drawing/2014/main" id="{38E9D512-FA57-4DF2-B003-B522999586B5}"/>
                 </a:ext>
               </a:extLst>
             </p:cNvPr>
@@ -17883,7 +17827,7 @@
             <p:cNvPr id="16" name="Freeform: Shape 15">
               <a:extLst>
                 <a:ext uri="{FF2B5EF4-FFF2-40B4-BE49-F238E27FC236}">
-                  <a16:creationId xmlns:a16="http://schemas.microsoft.com/office/drawing/2014/main" xmlns="" id="{FC2F2202-D3CA-49CC-9BE8-333543385688}"/>
+                  <a16:creationId xmlns:a16="http://schemas.microsoft.com/office/drawing/2014/main" id="{FC2F2202-D3CA-49CC-9BE8-333543385688}"/>
                 </a:ext>
               </a:extLst>
             </p:cNvPr>
@@ -18070,7 +18014,7 @@
             <p:cNvPr id="17" name="Freeform: Shape 16">
               <a:extLst>
                 <a:ext uri="{FF2B5EF4-FFF2-40B4-BE49-F238E27FC236}">
-                  <a16:creationId xmlns:a16="http://schemas.microsoft.com/office/drawing/2014/main" xmlns="" id="{6537E9A6-332F-48F2-AD54-D2D4E8A9727E}"/>
+                  <a16:creationId xmlns:a16="http://schemas.microsoft.com/office/drawing/2014/main" id="{6537E9A6-332F-48F2-AD54-D2D4E8A9727E}"/>
                 </a:ext>
               </a:extLst>
             </p:cNvPr>
@@ -18257,7 +18201,7 @@
             <p:cNvPr id="18" name="Freeform: Shape 17">
               <a:extLst>
                 <a:ext uri="{FF2B5EF4-FFF2-40B4-BE49-F238E27FC236}">
-                  <a16:creationId xmlns:a16="http://schemas.microsoft.com/office/drawing/2014/main" xmlns="" id="{D1658DF0-0E3E-4781-A34E-D2A6C306F8F8}"/>
+                  <a16:creationId xmlns:a16="http://schemas.microsoft.com/office/drawing/2014/main" id="{D1658DF0-0E3E-4781-A34E-D2A6C306F8F8}"/>
                 </a:ext>
               </a:extLst>
             </p:cNvPr>
@@ -18444,7 +18388,7 @@
             <p:cNvPr id="6" name="Freeform: Shape 5">
               <a:extLst>
                 <a:ext uri="{FF2B5EF4-FFF2-40B4-BE49-F238E27FC236}">
-                  <a16:creationId xmlns:a16="http://schemas.microsoft.com/office/drawing/2014/main" xmlns="" id="{E9080B4D-D816-4F72-83B1-0F6E8D7A6A41}"/>
+                  <a16:creationId xmlns:a16="http://schemas.microsoft.com/office/drawing/2014/main" id="{E9080B4D-D816-4F72-83B1-0F6E8D7A6A41}"/>
                 </a:ext>
               </a:extLst>
             </p:cNvPr>
@@ -18631,7 +18575,7 @@
             <p:cNvPr id="13" name="Freeform: Shape 12">
               <a:extLst>
                 <a:ext uri="{FF2B5EF4-FFF2-40B4-BE49-F238E27FC236}">
-                  <a16:creationId xmlns:a16="http://schemas.microsoft.com/office/drawing/2014/main" xmlns="" id="{AEC0139D-BDCC-4180-8FDA-23A71C8812E2}"/>
+                  <a16:creationId xmlns:a16="http://schemas.microsoft.com/office/drawing/2014/main" id="{AEC0139D-BDCC-4180-8FDA-23A71C8812E2}"/>
                 </a:ext>
               </a:extLst>
             </p:cNvPr>
@@ -18818,7 +18762,7 @@
             <p:cNvPr id="14" name="Freeform: Shape 13">
               <a:extLst>
                 <a:ext uri="{FF2B5EF4-FFF2-40B4-BE49-F238E27FC236}">
-                  <a16:creationId xmlns:a16="http://schemas.microsoft.com/office/drawing/2014/main" xmlns="" id="{FEEBB0A9-65CA-437D-A061-B2BE9693B65F}"/>
+                  <a16:creationId xmlns:a16="http://schemas.microsoft.com/office/drawing/2014/main" id="{FEEBB0A9-65CA-437D-A061-B2BE9693B65F}"/>
                 </a:ext>
               </a:extLst>
             </p:cNvPr>
@@ -19005,7 +18949,7 @@
             <p:cNvPr id="60" name="Freeform: Shape 59">
               <a:extLst>
                 <a:ext uri="{FF2B5EF4-FFF2-40B4-BE49-F238E27FC236}">
-                  <a16:creationId xmlns:a16="http://schemas.microsoft.com/office/drawing/2014/main" xmlns="" id="{65E98B04-0A7B-4691-98A2-5853CA661777}"/>
+                  <a16:creationId xmlns:a16="http://schemas.microsoft.com/office/drawing/2014/main" id="{65E98B04-0A7B-4691-98A2-5853CA661777}"/>
                 </a:ext>
               </a:extLst>
             </p:cNvPr>
@@ -19192,7 +19136,7 @@
             <p:cNvPr id="90" name="Freeform: Shape 89">
               <a:extLst>
                 <a:ext uri="{FF2B5EF4-FFF2-40B4-BE49-F238E27FC236}">
-                  <a16:creationId xmlns:a16="http://schemas.microsoft.com/office/drawing/2014/main" xmlns="" id="{62BAAC22-BD25-4457-83E3-35212239CCB2}"/>
+                  <a16:creationId xmlns:a16="http://schemas.microsoft.com/office/drawing/2014/main" id="{62BAAC22-BD25-4457-83E3-35212239CCB2}"/>
                 </a:ext>
               </a:extLst>
             </p:cNvPr>
@@ -19379,7 +19323,7 @@
             <p:cNvPr id="8" name="Freeform: Shape 7">
               <a:extLst>
                 <a:ext uri="{FF2B5EF4-FFF2-40B4-BE49-F238E27FC236}">
-                  <a16:creationId xmlns:a16="http://schemas.microsoft.com/office/drawing/2014/main" xmlns="" id="{A3711DF4-0204-481C-AAFC-4896961D1390}"/>
+                  <a16:creationId xmlns:a16="http://schemas.microsoft.com/office/drawing/2014/main" id="{A3711DF4-0204-481C-AAFC-4896961D1390}"/>
                 </a:ext>
               </a:extLst>
             </p:cNvPr>
@@ -19566,7 +19510,7 @@
             <p:cNvPr id="12" name="Freeform: Shape 11">
               <a:extLst>
                 <a:ext uri="{FF2B5EF4-FFF2-40B4-BE49-F238E27FC236}">
-                  <a16:creationId xmlns:a16="http://schemas.microsoft.com/office/drawing/2014/main" xmlns="" id="{D810DCF5-AD56-4390-A477-EA666C50A046}"/>
+                  <a16:creationId xmlns:a16="http://schemas.microsoft.com/office/drawing/2014/main" id="{D810DCF5-AD56-4390-A477-EA666C50A046}"/>
                 </a:ext>
               </a:extLst>
             </p:cNvPr>
@@ -19753,7 +19697,7 @@
             <p:cNvPr id="10" name="Freeform: Shape 9">
               <a:extLst>
                 <a:ext uri="{FF2B5EF4-FFF2-40B4-BE49-F238E27FC236}">
-                  <a16:creationId xmlns:a16="http://schemas.microsoft.com/office/drawing/2014/main" xmlns="" id="{D2C73C3B-94DD-456B-BE17-278DA71A5197}"/>
+                  <a16:creationId xmlns:a16="http://schemas.microsoft.com/office/drawing/2014/main" id="{D2C73C3B-94DD-456B-BE17-278DA71A5197}"/>
                 </a:ext>
               </a:extLst>
             </p:cNvPr>
@@ -19940,7 +19884,7 @@
             <p:cNvPr id="11" name="Freeform: Shape 10">
               <a:extLst>
                 <a:ext uri="{FF2B5EF4-FFF2-40B4-BE49-F238E27FC236}">
-                  <a16:creationId xmlns:a16="http://schemas.microsoft.com/office/drawing/2014/main" xmlns="" id="{BF641A3E-E47C-4E3A-91C4-4D2C3071B668}"/>
+                  <a16:creationId xmlns:a16="http://schemas.microsoft.com/office/drawing/2014/main" id="{BF641A3E-E47C-4E3A-91C4-4D2C3071B668}"/>
                 </a:ext>
               </a:extLst>
             </p:cNvPr>
@@ -20127,7 +20071,7 @@
             <p:cNvPr id="37" name="Freeform: Shape 36">
               <a:extLst>
                 <a:ext uri="{FF2B5EF4-FFF2-40B4-BE49-F238E27FC236}">
-                  <a16:creationId xmlns:a16="http://schemas.microsoft.com/office/drawing/2014/main" xmlns="" id="{CAC63132-F0D2-45B0-9879-4072AC14ED95}"/>
+                  <a16:creationId xmlns:a16="http://schemas.microsoft.com/office/drawing/2014/main" id="{CAC63132-F0D2-45B0-9879-4072AC14ED95}"/>
                 </a:ext>
               </a:extLst>
             </p:cNvPr>
@@ -20314,7 +20258,7 @@
             <p:cNvPr id="40" name="Freeform: Shape 39">
               <a:extLst>
                 <a:ext uri="{FF2B5EF4-FFF2-40B4-BE49-F238E27FC236}">
-                  <a16:creationId xmlns:a16="http://schemas.microsoft.com/office/drawing/2014/main" xmlns="" id="{9583580F-2D27-4507-8AD1-7360E7BA0B26}"/>
+                  <a16:creationId xmlns:a16="http://schemas.microsoft.com/office/drawing/2014/main" id="{9583580F-2D27-4507-8AD1-7360E7BA0B26}"/>
                 </a:ext>
               </a:extLst>
             </p:cNvPr>
@@ -20501,7 +20445,7 @@
             <p:cNvPr id="105" name="Freeform: Shape 104">
               <a:extLst>
                 <a:ext uri="{FF2B5EF4-FFF2-40B4-BE49-F238E27FC236}">
-                  <a16:creationId xmlns:a16="http://schemas.microsoft.com/office/drawing/2014/main" xmlns="" id="{CE09BD26-897A-4AFA-B51B-AFD401B7C927}"/>
+                  <a16:creationId xmlns:a16="http://schemas.microsoft.com/office/drawing/2014/main" id="{CE09BD26-897A-4AFA-B51B-AFD401B7C927}"/>
                 </a:ext>
               </a:extLst>
             </p:cNvPr>
@@ -20688,7 +20632,7 @@
             <p:cNvPr id="129" name="Freeform: Shape 128">
               <a:extLst>
                 <a:ext uri="{FF2B5EF4-FFF2-40B4-BE49-F238E27FC236}">
-                  <a16:creationId xmlns:a16="http://schemas.microsoft.com/office/drawing/2014/main" xmlns="" id="{818554A2-F00D-4C47-A12C-BF6F9376D51B}"/>
+                  <a16:creationId xmlns:a16="http://schemas.microsoft.com/office/drawing/2014/main" id="{818554A2-F00D-4C47-A12C-BF6F9376D51B}"/>
                 </a:ext>
               </a:extLst>
             </p:cNvPr>
@@ -20875,7 +20819,7 @@
             <p:cNvPr id="130" name="Freeform: Shape 129">
               <a:extLst>
                 <a:ext uri="{FF2B5EF4-FFF2-40B4-BE49-F238E27FC236}">
-                  <a16:creationId xmlns:a16="http://schemas.microsoft.com/office/drawing/2014/main" xmlns="" id="{409ADEEC-05DC-4F5A-96A7-B3A3C4FC66D4}"/>
+                  <a16:creationId xmlns:a16="http://schemas.microsoft.com/office/drawing/2014/main" id="{409ADEEC-05DC-4F5A-96A7-B3A3C4FC66D4}"/>
                 </a:ext>
               </a:extLst>
             </p:cNvPr>
@@ -21062,7 +21006,7 @@
             <p:cNvPr id="136" name="Freeform: Shape 135">
               <a:extLst>
                 <a:ext uri="{FF2B5EF4-FFF2-40B4-BE49-F238E27FC236}">
-                  <a16:creationId xmlns:a16="http://schemas.microsoft.com/office/drawing/2014/main" xmlns="" id="{99AEDFE0-EC38-455E-8574-2399D4F8BD8A}"/>
+                  <a16:creationId xmlns:a16="http://schemas.microsoft.com/office/drawing/2014/main" id="{99AEDFE0-EC38-455E-8574-2399D4F8BD8A}"/>
                 </a:ext>
               </a:extLst>
             </p:cNvPr>
@@ -21277,7 +21221,13 @@
       </p:grpSpPr>
       <p:grpSp>
         <p:nvGrpSpPr>
-          <p:cNvPr id="2" name="Group 1"/>
+          <p:cNvPr id="3" name="Group 2">
+            <a:extLst>
+              <a:ext uri="{FF2B5EF4-FFF2-40B4-BE49-F238E27FC236}">
+                <a16:creationId xmlns:a16="http://schemas.microsoft.com/office/drawing/2014/main" id="{3FD38EE5-EEED-439D-AF90-2D7070294469}"/>
+              </a:ext>
+            </a:extLst>
+          </p:cNvPr>
           <p:cNvGrpSpPr/>
           <p:nvPr/>
         </p:nvGrpSpPr>
@@ -21291,10 +21241,60 @@
         </p:grpSpPr>
         <p:cxnSp>
           <p:nvCxnSpPr>
+            <p:cNvPr id="20" name="Straight Connector 19">
+              <a:extLst>
+                <a:ext uri="{FF2B5EF4-FFF2-40B4-BE49-F238E27FC236}">
+                  <a16:creationId xmlns:a16="http://schemas.microsoft.com/office/drawing/2014/main" id="{D355C41F-D8B6-49BF-936E-6AC58DD7F6F9}"/>
+                </a:ext>
+              </a:extLst>
+            </p:cNvPr>
+            <p:cNvCxnSpPr>
+              <a:cxnSpLocks/>
+            </p:cNvCxnSpPr>
+            <p:nvPr/>
+          </p:nvCxnSpPr>
+          <p:spPr>
+            <a:xfrm flipH="1">
+              <a:off x="5176847" y="4166128"/>
+              <a:ext cx="2992" cy="463897"/>
+            </a:xfrm>
+            <a:prstGeom prst="line">
+              <a:avLst/>
+            </a:prstGeom>
+            <a:ln w="38100">
+              <a:solidFill>
+                <a:schemeClr val="tx1"/>
+              </a:solidFill>
+            </a:ln>
+            <a:effectLst>
+              <a:outerShdw blurRad="50800" dist="38100" dir="2700000" algn="tl" rotWithShape="0">
+                <a:prstClr val="black">
+                  <a:alpha val="40000"/>
+                </a:prstClr>
+              </a:outerShdw>
+            </a:effectLst>
+          </p:spPr>
+          <p:style>
+            <a:lnRef idx="1">
+              <a:schemeClr val="accent1"/>
+            </a:lnRef>
+            <a:fillRef idx="0">
+              <a:schemeClr val="accent1"/>
+            </a:fillRef>
+            <a:effectRef idx="0">
+              <a:schemeClr val="accent1"/>
+            </a:effectRef>
+            <a:fontRef idx="minor">
+              <a:schemeClr val="tx1"/>
+            </a:fontRef>
+          </p:style>
+        </p:cxnSp>
+        <p:cxnSp>
+          <p:nvCxnSpPr>
             <p:cNvPr id="167" name="Straight Connector 166">
               <a:extLst>
                 <a:ext uri="{FF2B5EF4-FFF2-40B4-BE49-F238E27FC236}">
-                  <a16:creationId xmlns:a16="http://schemas.microsoft.com/office/drawing/2014/main" xmlns="" id="{AADC7CEF-3F64-40CE-826A-ADF54345AD4B}"/>
+                  <a16:creationId xmlns:a16="http://schemas.microsoft.com/office/drawing/2014/main" id="{AADC7CEF-3F64-40CE-826A-ADF54345AD4B}"/>
                 </a:ext>
               </a:extLst>
             </p:cNvPr>
@@ -21344,7 +21344,7 @@
             <p:cNvPr id="160" name="Straight Connector 159">
               <a:extLst>
                 <a:ext uri="{FF2B5EF4-FFF2-40B4-BE49-F238E27FC236}">
-                  <a16:creationId xmlns:a16="http://schemas.microsoft.com/office/drawing/2014/main" xmlns="" id="{3EE70462-2985-40A1-8D6E-B81E2EDA33CC}"/>
+                  <a16:creationId xmlns:a16="http://schemas.microsoft.com/office/drawing/2014/main" id="{3EE70462-2985-40A1-8D6E-B81E2EDA33CC}"/>
                 </a:ext>
               </a:extLst>
             </p:cNvPr>
@@ -21394,7 +21394,7 @@
             <p:cNvPr id="162" name="Straight Connector 161">
               <a:extLst>
                 <a:ext uri="{FF2B5EF4-FFF2-40B4-BE49-F238E27FC236}">
-                  <a16:creationId xmlns:a16="http://schemas.microsoft.com/office/drawing/2014/main" xmlns="" id="{49834E44-CDA2-4053-A5A9-56437BA2AC99}"/>
+                  <a16:creationId xmlns:a16="http://schemas.microsoft.com/office/drawing/2014/main" id="{49834E44-CDA2-4053-A5A9-56437BA2AC99}"/>
                 </a:ext>
               </a:extLst>
             </p:cNvPr>
@@ -21444,7 +21444,7 @@
             <p:cNvPr id="149" name="Straight Connector 148">
               <a:extLst>
                 <a:ext uri="{FF2B5EF4-FFF2-40B4-BE49-F238E27FC236}">
-                  <a16:creationId xmlns:a16="http://schemas.microsoft.com/office/drawing/2014/main" xmlns="" id="{53EEDD3B-73D6-4968-80BC-03B0E38AA5EA}"/>
+                  <a16:creationId xmlns:a16="http://schemas.microsoft.com/office/drawing/2014/main" id="{53EEDD3B-73D6-4968-80BC-03B0E38AA5EA}"/>
                 </a:ext>
               </a:extLst>
             </p:cNvPr>
@@ -21494,7 +21494,7 @@
             <p:cNvPr id="108" name="Straight Connector 107">
               <a:extLst>
                 <a:ext uri="{FF2B5EF4-FFF2-40B4-BE49-F238E27FC236}">
-                  <a16:creationId xmlns:a16="http://schemas.microsoft.com/office/drawing/2014/main" xmlns="" id="{E9148A74-33CF-42D8-9545-D1752EA08EE1}"/>
+                  <a16:creationId xmlns:a16="http://schemas.microsoft.com/office/drawing/2014/main" id="{E9148A74-33CF-42D8-9545-D1752EA08EE1}"/>
                 </a:ext>
               </a:extLst>
             </p:cNvPr>
@@ -21544,7 +21544,7 @@
             <p:cNvPr id="115" name="Straight Connector 114">
               <a:extLst>
                 <a:ext uri="{FF2B5EF4-FFF2-40B4-BE49-F238E27FC236}">
-                  <a16:creationId xmlns:a16="http://schemas.microsoft.com/office/drawing/2014/main" xmlns="" id="{73023383-1407-4344-A5C8-06FE8CA41955}"/>
+                  <a16:creationId xmlns:a16="http://schemas.microsoft.com/office/drawing/2014/main" id="{73023383-1407-4344-A5C8-06FE8CA41955}"/>
                 </a:ext>
               </a:extLst>
             </p:cNvPr>
@@ -21594,7 +21594,7 @@
             <p:cNvPr id="16" name="Freeform: Shape 15">
               <a:extLst>
                 <a:ext uri="{FF2B5EF4-FFF2-40B4-BE49-F238E27FC236}">
-                  <a16:creationId xmlns:a16="http://schemas.microsoft.com/office/drawing/2014/main" xmlns="" id="{FC2F2202-D3CA-49CC-9BE8-333543385688}"/>
+                  <a16:creationId xmlns:a16="http://schemas.microsoft.com/office/drawing/2014/main" id="{FC2F2202-D3CA-49CC-9BE8-333543385688}"/>
                 </a:ext>
               </a:extLst>
             </p:cNvPr>
@@ -21781,7 +21781,7 @@
             <p:cNvPr id="17" name="Freeform: Shape 16">
               <a:extLst>
                 <a:ext uri="{FF2B5EF4-FFF2-40B4-BE49-F238E27FC236}">
-                  <a16:creationId xmlns:a16="http://schemas.microsoft.com/office/drawing/2014/main" xmlns="" id="{6537E9A6-332F-48F2-AD54-D2D4E8A9727E}"/>
+                  <a16:creationId xmlns:a16="http://schemas.microsoft.com/office/drawing/2014/main" id="{6537E9A6-332F-48F2-AD54-D2D4E8A9727E}"/>
                 </a:ext>
               </a:extLst>
             </p:cNvPr>
@@ -21968,7 +21968,7 @@
             <p:cNvPr id="18" name="Freeform: Shape 17">
               <a:extLst>
                 <a:ext uri="{FF2B5EF4-FFF2-40B4-BE49-F238E27FC236}">
-                  <a16:creationId xmlns:a16="http://schemas.microsoft.com/office/drawing/2014/main" xmlns="" id="{D1658DF0-0E3E-4781-A34E-D2A6C306F8F8}"/>
+                  <a16:creationId xmlns:a16="http://schemas.microsoft.com/office/drawing/2014/main" id="{D1658DF0-0E3E-4781-A34E-D2A6C306F8F8}"/>
                 </a:ext>
               </a:extLst>
             </p:cNvPr>
@@ -22155,7 +22155,7 @@
             <p:cNvPr id="13" name="Freeform: Shape 12">
               <a:extLst>
                 <a:ext uri="{FF2B5EF4-FFF2-40B4-BE49-F238E27FC236}">
-                  <a16:creationId xmlns:a16="http://schemas.microsoft.com/office/drawing/2014/main" xmlns="" id="{AEC0139D-BDCC-4180-8FDA-23A71C8812E2}"/>
+                  <a16:creationId xmlns:a16="http://schemas.microsoft.com/office/drawing/2014/main" id="{AEC0139D-BDCC-4180-8FDA-23A71C8812E2}"/>
                 </a:ext>
               </a:extLst>
             </p:cNvPr>
@@ -22342,7 +22342,7 @@
             <p:cNvPr id="14" name="Freeform: Shape 13">
               <a:extLst>
                 <a:ext uri="{FF2B5EF4-FFF2-40B4-BE49-F238E27FC236}">
-                  <a16:creationId xmlns:a16="http://schemas.microsoft.com/office/drawing/2014/main" xmlns="" id="{FEEBB0A9-65CA-437D-A061-B2BE9693B65F}"/>
+                  <a16:creationId xmlns:a16="http://schemas.microsoft.com/office/drawing/2014/main" id="{FEEBB0A9-65CA-437D-A061-B2BE9693B65F}"/>
                 </a:ext>
               </a:extLst>
             </p:cNvPr>
@@ -22529,7 +22529,7 @@
             <p:cNvPr id="60" name="Freeform: Shape 59">
               <a:extLst>
                 <a:ext uri="{FF2B5EF4-FFF2-40B4-BE49-F238E27FC236}">
-                  <a16:creationId xmlns:a16="http://schemas.microsoft.com/office/drawing/2014/main" xmlns="" id="{65E98B04-0A7B-4691-98A2-5853CA661777}"/>
+                  <a16:creationId xmlns:a16="http://schemas.microsoft.com/office/drawing/2014/main" id="{65E98B04-0A7B-4691-98A2-5853CA661777}"/>
                 </a:ext>
               </a:extLst>
             </p:cNvPr>
@@ -22716,7 +22716,7 @@
             <p:cNvPr id="90" name="Freeform: Shape 89">
               <a:extLst>
                 <a:ext uri="{FF2B5EF4-FFF2-40B4-BE49-F238E27FC236}">
-                  <a16:creationId xmlns:a16="http://schemas.microsoft.com/office/drawing/2014/main" xmlns="" id="{62BAAC22-BD25-4457-83E3-35212239CCB2}"/>
+                  <a16:creationId xmlns:a16="http://schemas.microsoft.com/office/drawing/2014/main" id="{62BAAC22-BD25-4457-83E3-35212239CCB2}"/>
                 </a:ext>
               </a:extLst>
             </p:cNvPr>
@@ -22903,7 +22903,7 @@
             <p:cNvPr id="8" name="Freeform: Shape 7">
               <a:extLst>
                 <a:ext uri="{FF2B5EF4-FFF2-40B4-BE49-F238E27FC236}">
-                  <a16:creationId xmlns:a16="http://schemas.microsoft.com/office/drawing/2014/main" xmlns="" id="{A3711DF4-0204-481C-AAFC-4896961D1390}"/>
+                  <a16:creationId xmlns:a16="http://schemas.microsoft.com/office/drawing/2014/main" id="{A3711DF4-0204-481C-AAFC-4896961D1390}"/>
                 </a:ext>
               </a:extLst>
             </p:cNvPr>
@@ -23090,7 +23090,7 @@
             <p:cNvPr id="12" name="Freeform: Shape 11">
               <a:extLst>
                 <a:ext uri="{FF2B5EF4-FFF2-40B4-BE49-F238E27FC236}">
-                  <a16:creationId xmlns:a16="http://schemas.microsoft.com/office/drawing/2014/main" xmlns="" id="{D810DCF5-AD56-4390-A477-EA666C50A046}"/>
+                  <a16:creationId xmlns:a16="http://schemas.microsoft.com/office/drawing/2014/main" id="{D810DCF5-AD56-4390-A477-EA666C50A046}"/>
                 </a:ext>
               </a:extLst>
             </p:cNvPr>
@@ -23277,7 +23277,7 @@
             <p:cNvPr id="11" name="Freeform: Shape 10">
               <a:extLst>
                 <a:ext uri="{FF2B5EF4-FFF2-40B4-BE49-F238E27FC236}">
-                  <a16:creationId xmlns:a16="http://schemas.microsoft.com/office/drawing/2014/main" xmlns="" id="{BF641A3E-E47C-4E3A-91C4-4D2C3071B668}"/>
+                  <a16:creationId xmlns:a16="http://schemas.microsoft.com/office/drawing/2014/main" id="{BF641A3E-E47C-4E3A-91C4-4D2C3071B668}"/>
                 </a:ext>
               </a:extLst>
             </p:cNvPr>
@@ -23464,7 +23464,7 @@
             <p:cNvPr id="40" name="Freeform: Shape 39">
               <a:extLst>
                 <a:ext uri="{FF2B5EF4-FFF2-40B4-BE49-F238E27FC236}">
-                  <a16:creationId xmlns:a16="http://schemas.microsoft.com/office/drawing/2014/main" xmlns="" id="{9583580F-2D27-4507-8AD1-7360E7BA0B26}"/>
+                  <a16:creationId xmlns:a16="http://schemas.microsoft.com/office/drawing/2014/main" id="{9583580F-2D27-4507-8AD1-7360E7BA0B26}"/>
                 </a:ext>
               </a:extLst>
             </p:cNvPr>

</xml_diff>